<commit_message>
fix typos week 2
</commit_message>
<xml_diff>
--- a/03-competitive-market/slides-market.pptx
+++ b/03-competitive-market/slides-market.pptx
@@ -7716,7 +7716,7 @@
           <a:p>
             <a:fld id="{F1859F69-94B2-4F62-9C97-3A66B652706B}" type="datetimeFigureOut">
               <a:rPr lang="en-IL" smtClean="0"/>
-              <a:t>30/03/2025</a:t>
+              <a:t>11/03/2025</a:t>
             </a:fld>
             <a:endParaRPr lang="en-IL"/>
           </a:p>
@@ -7915,7 +7915,7 @@
           <a:p>
             <a:fld id="{F1859F69-94B2-4F62-9C97-3A66B652706B}" type="datetimeFigureOut">
               <a:rPr lang="en-IL" smtClean="0"/>
-              <a:t>30/03/2025</a:t>
+              <a:t>11/03/2025</a:t>
             </a:fld>
             <a:endParaRPr lang="en-IL"/>
           </a:p>
@@ -8190,7 +8190,7 @@
           <a:p>
             <a:fld id="{F1859F69-94B2-4F62-9C97-3A66B652706B}" type="datetimeFigureOut">
               <a:rPr lang="en-IL" smtClean="0"/>
-              <a:t>30/03/2025</a:t>
+              <a:t>11/03/2025</a:t>
             </a:fld>
             <a:endParaRPr lang="en-IL"/>
           </a:p>
@@ -8457,7 +8457,7 @@
           <a:p>
             <a:fld id="{F1859F69-94B2-4F62-9C97-3A66B652706B}" type="datetimeFigureOut">
               <a:rPr lang="en-IL" smtClean="0"/>
-              <a:t>30/03/2025</a:t>
+              <a:t>11/03/2025</a:t>
             </a:fld>
             <a:endParaRPr lang="en-IL"/>
           </a:p>
@@ -8871,7 +8871,7 @@
           <a:p>
             <a:fld id="{F1859F69-94B2-4F62-9C97-3A66B652706B}" type="datetimeFigureOut">
               <a:rPr lang="en-IL" smtClean="0"/>
-              <a:t>30/03/2025</a:t>
+              <a:t>11/03/2025</a:t>
             </a:fld>
             <a:endParaRPr lang="en-IL"/>
           </a:p>
@@ -9012,7 +9012,7 @@
           <a:p>
             <a:fld id="{F1859F69-94B2-4F62-9C97-3A66B652706B}" type="datetimeFigureOut">
               <a:rPr lang="en-IL" smtClean="0"/>
-              <a:t>30/03/2025</a:t>
+              <a:t>11/03/2025</a:t>
             </a:fld>
             <a:endParaRPr lang="en-IL"/>
           </a:p>
@@ -9387,7 +9387,7 @@
           <a:p>
             <a:fld id="{F1859F69-94B2-4F62-9C97-3A66B652706B}" type="datetimeFigureOut">
               <a:rPr lang="en-IL" smtClean="0"/>
-              <a:t>30/03/2025</a:t>
+              <a:t>11/03/2025</a:t>
             </a:fld>
             <a:endParaRPr lang="en-IL"/>
           </a:p>
@@ -9699,7 +9699,7 @@
           <a:p>
             <a:fld id="{F1859F69-94B2-4F62-9C97-3A66B652706B}" type="datetimeFigureOut">
               <a:rPr lang="en-IL" smtClean="0"/>
-              <a:t>30/03/2025</a:t>
+              <a:t>11/03/2025</a:t>
             </a:fld>
             <a:endParaRPr lang="en-IL"/>
           </a:p>
@@ -9987,7 +9987,7 @@
           <a:p>
             <a:fld id="{F1859F69-94B2-4F62-9C97-3A66B652706B}" type="datetimeFigureOut">
               <a:rPr lang="en-IL" smtClean="0"/>
-              <a:t>30/03/2025</a:t>
+              <a:t>11/03/2025</a:t>
             </a:fld>
             <a:endParaRPr lang="en-IL"/>
           </a:p>
@@ -10186,7 +10186,7 @@
           <a:p>
             <a:fld id="{F1859F69-94B2-4F62-9C97-3A66B652706B}" type="datetimeFigureOut">
               <a:rPr lang="en-IL" smtClean="0"/>
-              <a:t>30/03/2025</a:t>
+              <a:t>11/03/2025</a:t>
             </a:fld>
             <a:endParaRPr lang="en-IL"/>
           </a:p>
@@ -10395,7 +10395,7 @@
           <a:p>
             <a:fld id="{F1859F69-94B2-4F62-9C97-3A66B652706B}" type="datetimeFigureOut">
               <a:rPr lang="en-IL" smtClean="0"/>
-              <a:t>30/03/2025</a:t>
+              <a:t>11/03/2025</a:t>
             </a:fld>
             <a:endParaRPr lang="en-IL"/>
           </a:p>
@@ -13521,7 +13521,7 @@
           <a:p>
             <a:fld id="{F1859F69-94B2-4F62-9C97-3A66B652706B}" type="datetimeFigureOut">
               <a:rPr lang="en-IL" smtClean="0"/>
-              <a:t>30/03/2025</a:t>
+              <a:t>11/03/2025</a:t>
             </a:fld>
             <a:endParaRPr lang="en-IL"/>
           </a:p>

</xml_diff>